<commit_message>
Update 20-5조) 강윤구,김병근_CNN을 이용한 Wafer 불량 검출_220615 최종.pptx
</commit_message>
<xml_diff>
--- a/22-1 지능화 캡스톤 프로젝트/과제/20-5조) 강윤구,김병근_CNN을 이용한 Wafer 불량 검출_220615 최종.pptx
+++ b/22-1 지능화 캡스톤 프로젝트/과제/20-5조) 강윤구,김병근_CNN을 이용한 Wafer 불량 검출_220615 최종.pptx
@@ -7173,6 +7173,12 @@
               </a:rPr>
               <a:t>분류 성능</a:t>
             </a:r>
+            <a:r>
+              <a:rPr lang="en-US" altLang="ko-KR" sz="2000" b="1" dirty="0">
+                <a:latin typeface="+mn-ea"/>
+              </a:rPr>
+              <a:t/>
+            </a:r>
             <a:br>
               <a:rPr lang="en-US" altLang="ko-KR" sz="2000" b="1" dirty="0">
                 <a:latin typeface="+mn-ea"/>
@@ -8146,7 +8152,7 @@
         <p:spPr>
           <a:xfrm>
             <a:off x="155912" y="1188035"/>
-            <a:ext cx="8706254" cy="4672561"/>
+            <a:ext cx="8706254" cy="4708981"/>
           </a:xfrm>
           <a:prstGeom prst="rect">
             <a:avLst/>
@@ -8743,7 +8749,7 @@
                 <a:latin typeface="Arial" panose="020B0604020202020204" pitchFamily="34" charset="0"/>
                 <a:cs typeface="Arial" panose="020B0604020202020204" pitchFamily="34" charset="0"/>
               </a:rPr>
-              <a:t>김현용교수님의 딥러닝 관련 전문성에 감사하였습니다</a:t>
+              <a:t>도규원교수님 감사합니다</a:t>
             </a:r>
             <a:r>
               <a:rPr lang="en-US" altLang="ko-KR" sz="1400" dirty="0">
@@ -8753,18 +8759,25 @@
               <a:t>. </a:t>
             </a:r>
             <a:r>
+              <a:rPr lang="ko-KR" altLang="en-US" sz="1400" dirty="0" smtClean="0">
+                <a:latin typeface="Arial" panose="020B0604020202020204" pitchFamily="34" charset="0"/>
+                <a:cs typeface="Arial" panose="020B0604020202020204" pitchFamily="34" charset="0"/>
+              </a:rPr>
+              <a:t>김현용교수님의 </a:t>
+            </a:r>
+            <a:r>
               <a:rPr lang="ko-KR" altLang="en-US" sz="1400" dirty="0">
                 <a:latin typeface="Arial" panose="020B0604020202020204" pitchFamily="34" charset="0"/>
                 <a:cs typeface="Arial" panose="020B0604020202020204" pitchFamily="34" charset="0"/>
               </a:rPr>
-              <a:t>도규원교수님 수고 많으셨습니다</a:t>
+              <a:t>딥러닝 관련 전문성에 감사하였습니다</a:t>
             </a:r>
             <a:r>
               <a:rPr lang="en-US" altLang="ko-KR" sz="1400" dirty="0">
                 <a:latin typeface="Arial" panose="020B0604020202020204" pitchFamily="34" charset="0"/>
                 <a:cs typeface="Arial" panose="020B0604020202020204" pitchFamily="34" charset="0"/>
               </a:rPr>
-              <a:t>.</a:t>
+              <a:t>. </a:t>
             </a:r>
           </a:p>
           <a:p>
@@ -9249,6 +9262,12 @@
               </a:rPr>
               <a:t>수행방법</a:t>
             </a:r>
+            <a:r>
+              <a:rPr lang="en-US" altLang="ko-KR" sz="2000" b="1" dirty="0">
+                <a:latin typeface="+mn-ea"/>
+              </a:rPr>
+              <a:t/>
+            </a:r>
             <a:br>
               <a:rPr lang="en-US" altLang="ko-KR" sz="2000" b="1" dirty="0">
                 <a:latin typeface="+mn-ea"/>
@@ -9347,6 +9366,12 @@
                 <a:latin typeface="+mn-ea"/>
               </a:rPr>
               <a:t>과제를 수행 함</a:t>
+            </a:r>
+            <a:r>
+              <a:rPr lang="en-US" altLang="ko-KR" sz="1600" dirty="0">
+                <a:latin typeface="+mn-ea"/>
+              </a:rPr>
+              <a:t/>
             </a:r>
             <a:br>
               <a:rPr lang="en-US" altLang="ko-KR" sz="1600" dirty="0">
@@ -14637,6 +14662,12 @@
                 <a:latin typeface="+mn-ea"/>
               </a:rPr>
               <a:t>데이터 구성</a:t>
+            </a:r>
+            <a:r>
+              <a:rPr lang="en-US" altLang="ko-KR" sz="2000" b="1" dirty="0">
+                <a:latin typeface="+mn-ea"/>
+              </a:rPr>
+              <a:t/>
             </a:r>
             <a:br>
               <a:rPr lang="en-US" altLang="ko-KR" sz="2000" b="1" dirty="0">
@@ -36954,21 +36985,6 @@
 </file>
 
 <file path=customXml/item1.xml><?xml version="1.0" encoding="utf-8"?>
-<p:properties xmlns:p="http://schemas.microsoft.com/office/2006/metadata/properties" xmlns:xsi="http://www.w3.org/2001/XMLSchema-instance" xmlns:pc="http://schemas.microsoft.com/office/infopath/2007/PartnerControls">
-  <documentManagement/>
-</p:properties>
-</file>
-
-<file path=customXml/item2.xml><?xml version="1.0" encoding="utf-8"?>
-<?mso-contentType ?>
-<FormTemplates xmlns="http://schemas.microsoft.com/sharepoint/v3/contenttype/forms">
-  <Display>DocumentLibraryForm</Display>
-  <Edit>DocumentLibraryForm</Edit>
-  <New>DocumentLibraryForm</New>
-</FormTemplates>
-</file>
-
-<file path=customXml/item3.xml><?xml version="1.0" encoding="utf-8"?>
 <ct:contentTypeSchema xmlns:ct="http://schemas.microsoft.com/office/2006/metadata/contentType" xmlns:ma="http://schemas.microsoft.com/office/2006/metadata/properties/metaAttributes" ct:_="" ma:_="" ma:contentTypeName="문서" ma:contentTypeID="0x01010048E678091357F24E8F48B77CA27B8190" ma:contentTypeVersion="10" ma:contentTypeDescription="새 문서를 만듭니다." ma:contentTypeScope="" ma:versionID="6214b655059a3f220a35174d05e9def0">
   <xsd:schema xmlns:xsd="http://www.w3.org/2001/XMLSchema" xmlns:xs="http://www.w3.org/2001/XMLSchema" xmlns:p="http://schemas.microsoft.com/office/2006/metadata/properties" xmlns:ns2="df922d41-91bf-45f8-8b2c-e1591bc010d5" targetNamespace="http://schemas.microsoft.com/office/2006/metadata/properties" ma:root="true" ma:fieldsID="f68fc4224146a5b1fae48ae4f549800b" ns2:_="">
     <xsd:import namespace="df922d41-91bf-45f8-8b2c-e1591bc010d5"/>
@@ -37152,31 +37168,22 @@
 </ct:contentTypeSchema>
 </file>
 
-<file path=customXml/itemProps1.xml><?xml version="1.0" encoding="utf-8"?>
-<ds:datastoreItem xmlns:ds="http://schemas.openxmlformats.org/officeDocument/2006/customXml" ds:itemID="{37FA2EDF-CBB7-475B-B0D9-861160A98246}">
-  <ds:schemaRefs>
-    <ds:schemaRef ds:uri="http://schemas.microsoft.com/office/2006/metadata/properties"/>
-    <ds:schemaRef ds:uri="http://purl.org/dc/terms/"/>
-    <ds:schemaRef ds:uri="http://schemas.openxmlformats.org/package/2006/metadata/core-properties"/>
-    <ds:schemaRef ds:uri="http://schemas.microsoft.com/office/2006/documentManagement/types"/>
-    <ds:schemaRef ds:uri="http://schemas.microsoft.com/office/infopath/2007/PartnerControls"/>
-    <ds:schemaRef ds:uri="df922d41-91bf-45f8-8b2c-e1591bc010d5"/>
-    <ds:schemaRef ds:uri="http://purl.org/dc/elements/1.1/"/>
-    <ds:schemaRef ds:uri="http://www.w3.org/XML/1998/namespace"/>
-    <ds:schemaRef ds:uri="http://purl.org/dc/dcmitype/"/>
-  </ds:schemaRefs>
-</ds:datastoreItem>
+<file path=customXml/item2.xml><?xml version="1.0" encoding="utf-8"?>
+<?mso-contentType ?>
+<FormTemplates xmlns="http://schemas.microsoft.com/sharepoint/v3/contenttype/forms">
+  <Display>DocumentLibraryForm</Display>
+  <Edit>DocumentLibraryForm</Edit>
+  <New>DocumentLibraryForm</New>
+</FormTemplates>
 </file>
 
-<file path=customXml/itemProps2.xml><?xml version="1.0" encoding="utf-8"?>
-<ds:datastoreItem xmlns:ds="http://schemas.openxmlformats.org/officeDocument/2006/customXml" ds:itemID="{6A025E80-6017-4340-852A-AD128310F2C0}">
-  <ds:schemaRefs>
-    <ds:schemaRef ds:uri="http://schemas.microsoft.com/sharepoint/v3/contenttype/forms"/>
-  </ds:schemaRefs>
-</ds:datastoreItem>
+<file path=customXml/item3.xml><?xml version="1.0" encoding="utf-8"?>
+<p:properties xmlns:p="http://schemas.microsoft.com/office/2006/metadata/properties" xmlns:xsi="http://www.w3.org/2001/XMLSchema-instance" xmlns:pc="http://schemas.microsoft.com/office/infopath/2007/PartnerControls">
+  <documentManagement/>
+</p:properties>
 </file>
 
-<file path=customXml/itemProps3.xml><?xml version="1.0" encoding="utf-8"?>
+<file path=customXml/itemProps1.xml><?xml version="1.0" encoding="utf-8"?>
 <ds:datastoreItem xmlns:ds="http://schemas.openxmlformats.org/officeDocument/2006/customXml" ds:itemID="{8752C289-7328-4F4C-BE3C-6FF959ED22DE}">
   <ds:schemaRefs>
     <ds:schemaRef ds:uri="http://schemas.microsoft.com/office/2006/metadata/contentType"/>
@@ -37192,4 +37199,28 @@
     <ds:schemaRef ds:uri="http://schemas.microsoft.com/internal/obd"/>
   </ds:schemaRefs>
 </ds:datastoreItem>
+</file>
+
+<file path=customXml/itemProps2.xml><?xml version="1.0" encoding="utf-8"?>
+<ds:datastoreItem xmlns:ds="http://schemas.openxmlformats.org/officeDocument/2006/customXml" ds:itemID="{6A025E80-6017-4340-852A-AD128310F2C0}">
+  <ds:schemaRefs>
+    <ds:schemaRef ds:uri="http://schemas.microsoft.com/sharepoint/v3/contenttype/forms"/>
+  </ds:schemaRefs>
+</ds:datastoreItem>
+</file>
+
+<file path=customXml/itemProps3.xml><?xml version="1.0" encoding="utf-8"?>
+<ds:datastoreItem xmlns:ds="http://schemas.openxmlformats.org/officeDocument/2006/customXml" ds:itemID="{37FA2EDF-CBB7-475B-B0D9-861160A98246}">
+  <ds:schemaRefs>
+    <ds:schemaRef ds:uri="http://schemas.openxmlformats.org/package/2006/metadata/core-properties"/>
+    <ds:schemaRef ds:uri="http://purl.org/dc/elements/1.1/"/>
+    <ds:schemaRef ds:uri="http://purl.org/dc/dcmitype/"/>
+    <ds:schemaRef ds:uri="http://schemas.microsoft.com/office/infopath/2007/PartnerControls"/>
+    <ds:schemaRef ds:uri="df922d41-91bf-45f8-8b2c-e1591bc010d5"/>
+    <ds:schemaRef ds:uri="http://purl.org/dc/terms/"/>
+    <ds:schemaRef ds:uri="http://schemas.microsoft.com/office/2006/documentManagement/types"/>
+    <ds:schemaRef ds:uri="http://schemas.microsoft.com/office/2006/metadata/properties"/>
+    <ds:schemaRef ds:uri="http://www.w3.org/XML/1998/namespace"/>
+  </ds:schemaRefs>
+</ds:datastoreItem>
 </file>
</xml_diff>